<commit_message>
FInished Critical slides with trip flow and data structure
</commit_message>
<xml_diff>
--- a/Files/powerpoints/toddsCriticalDesignReviewSlides.pptx
+++ b/Files/powerpoints/toddsCriticalDesignReviewSlides.pptx
@@ -6,19 +6,20 @@
   </p:sldMasterIdLst>
   <p:sldIdLst>
     <p:sldId id="256" r:id="rId2"/>
-    <p:sldId id="258" r:id="rId3"/>
-    <p:sldId id="260" r:id="rId4"/>
-    <p:sldId id="261" r:id="rId5"/>
-    <p:sldId id="262" r:id="rId6"/>
-    <p:sldId id="265" r:id="rId7"/>
-    <p:sldId id="266" r:id="rId8"/>
-    <p:sldId id="267" r:id="rId9"/>
-    <p:sldId id="268" r:id="rId10"/>
-    <p:sldId id="269" r:id="rId11"/>
-    <p:sldId id="270" r:id="rId12"/>
-    <p:sldId id="257" r:id="rId13"/>
-    <p:sldId id="263" r:id="rId14"/>
-    <p:sldId id="264" r:id="rId15"/>
+    <p:sldId id="262" r:id="rId3"/>
+    <p:sldId id="258" r:id="rId4"/>
+    <p:sldId id="260" r:id="rId5"/>
+    <p:sldId id="261" r:id="rId6"/>
+    <p:sldId id="271" r:id="rId7"/>
+    <p:sldId id="265" r:id="rId8"/>
+    <p:sldId id="266" r:id="rId9"/>
+    <p:sldId id="267" r:id="rId10"/>
+    <p:sldId id="268" r:id="rId11"/>
+    <p:sldId id="269" r:id="rId12"/>
+    <p:sldId id="270" r:id="rId13"/>
+    <p:sldId id="257" r:id="rId14"/>
+    <p:sldId id="263" r:id="rId15"/>
+    <p:sldId id="264" r:id="rId16"/>
   </p:sldIdLst>
   <p:sldSz cx="9144000" cy="6858000" type="screen4x3"/>
   <p:notesSz cx="6858000" cy="9144000"/>
@@ -3125,14 +3126,16 @@
           </a:xfrm>
         </p:spPr>
         <p:txBody>
-          <a:bodyPr/>
-          <a:lstStyle/>
-          <a:p>
-            <a:r>
-              <a:rPr lang="en-US" dirty="0" smtClean="0"/>
+          <a:bodyPr>
+            <a:normAutofit/>
+          </a:bodyPr>
+          <a:lstStyle/>
+          <a:p>
+            <a:r>
+              <a:rPr lang="en-US" sz="3600" dirty="0" smtClean="0"/>
               <a:t>Completed Items</a:t>
             </a:r>
-            <a:endParaRPr lang="en-US" dirty="0"/>
+            <a:endParaRPr lang="en-US" sz="3600" dirty="0"/>
           </a:p>
         </p:txBody>
       </p:sp>
@@ -3381,10 +3384,77 @@
   <p:clrMapOvr>
     <a:masterClrMapping/>
   </p:clrMapOvr>
+  <p:timing>
+    <p:tnLst>
+      <p:par>
+        <p:cTn id="1" dur="indefinite" restart="never" nodeType="tmRoot"/>
+      </p:par>
+    </p:tnLst>
+  </p:timing>
 </p:sld>
 </file>
 
 <file path=ppt/slides/slide10.xml><?xml version="1.0" encoding="utf-8"?>
+<p:sld xmlns:a="http://schemas.openxmlformats.org/drawingml/2006/main" xmlns:r="http://schemas.openxmlformats.org/officeDocument/2006/relationships" xmlns:p="http://schemas.openxmlformats.org/presentationml/2006/main">
+  <p:cSld>
+    <p:spTree>
+      <p:nvGrpSpPr>
+        <p:cNvPr id="1" name=""/>
+        <p:cNvGrpSpPr/>
+        <p:nvPr/>
+      </p:nvGrpSpPr>
+      <p:grpSpPr>
+        <a:xfrm>
+          <a:off x="0" y="0"/>
+          <a:ext cx="0" cy="0"/>
+          <a:chOff x="0" y="0"/>
+          <a:chExt cx="0" cy="0"/>
+        </a:xfrm>
+      </p:grpSpPr>
+      <p:pic>
+        <p:nvPicPr>
+          <p:cNvPr id="2" name="Picture 1"/>
+          <p:cNvPicPr>
+            <a:picLocks noChangeAspect="1"/>
+          </p:cNvPicPr>
+          <p:nvPr/>
+        </p:nvPicPr>
+        <p:blipFill>
+          <a:blip r:embed="rId2" cstate="print">
+            <a:extLst>
+              <a:ext uri="{28A0092B-C50C-407E-A947-70E740481C1C}">
+                <a14:useLocalDpi xmlns:a14="http://schemas.microsoft.com/office/drawing/2010/main" val="0"/>
+              </a:ext>
+            </a:extLst>
+          </a:blip>
+          <a:stretch>
+            <a:fillRect/>
+          </a:stretch>
+        </p:blipFill>
+        <p:spPr>
+          <a:xfrm>
+            <a:off x="134470" y="0"/>
+            <a:ext cx="8875059" cy="6858000"/>
+          </a:xfrm>
+          <a:prstGeom prst="rect">
+            <a:avLst/>
+          </a:prstGeom>
+        </p:spPr>
+      </p:pic>
+    </p:spTree>
+    <p:extLst>
+      <p:ext uri="{BB962C8B-B14F-4D97-AF65-F5344CB8AC3E}">
+        <p14:creationId xmlns:p14="http://schemas.microsoft.com/office/powerpoint/2010/main" val="3633874506"/>
+      </p:ext>
+    </p:extLst>
+  </p:cSld>
+  <p:clrMapOvr>
+    <a:masterClrMapping/>
+  </p:clrMapOvr>
+</p:sld>
+</file>
+
+<file path=ppt/slides/slide11.xml><?xml version="1.0" encoding="utf-8"?>
 <p:sld xmlns:a="http://schemas.openxmlformats.org/drawingml/2006/main" xmlns:r="http://schemas.openxmlformats.org/officeDocument/2006/relationships" xmlns:p="http://schemas.openxmlformats.org/presentationml/2006/main">
   <p:cSld>
     <p:spTree>
@@ -3441,10 +3511,17 @@
   <p:clrMapOvr>
     <a:masterClrMapping/>
   </p:clrMapOvr>
+  <p:timing>
+    <p:tnLst>
+      <p:par>
+        <p:cTn id="1" dur="indefinite" restart="never" nodeType="tmRoot"/>
+      </p:par>
+    </p:tnLst>
+  </p:timing>
 </p:sld>
 </file>
 
-<file path=ppt/slides/slide11.xml><?xml version="1.0" encoding="utf-8"?>
+<file path=ppt/slides/slide12.xml><?xml version="1.0" encoding="utf-8"?>
 <p:sld xmlns:a="http://schemas.openxmlformats.org/drawingml/2006/main" xmlns:r="http://schemas.openxmlformats.org/officeDocument/2006/relationships" xmlns:p="http://schemas.openxmlformats.org/presentationml/2006/main">
   <p:cSld>
     <p:spTree>
@@ -3504,7 +3581,7 @@
 </p:sld>
 </file>
 
-<file path=ppt/slides/slide12.xml><?xml version="1.0" encoding="utf-8"?>
+<file path=ppt/slides/slide13.xml><?xml version="1.0" encoding="utf-8"?>
 <p:sld xmlns:a="http://schemas.openxmlformats.org/drawingml/2006/main" xmlns:r="http://schemas.openxmlformats.org/officeDocument/2006/relationships" xmlns:p="http://schemas.openxmlformats.org/presentationml/2006/main">
   <p:cSld>
     <p:spTree>
@@ -3704,10 +3781,17 @@
   <p:clrMapOvr>
     <a:masterClrMapping/>
   </p:clrMapOvr>
+  <p:timing>
+    <p:tnLst>
+      <p:par>
+        <p:cTn id="1" dur="indefinite" restart="never" nodeType="tmRoot"/>
+      </p:par>
+    </p:tnLst>
+  </p:timing>
 </p:sld>
 </file>
 
-<file path=ppt/slides/slide13.xml><?xml version="1.0" encoding="utf-8"?>
+<file path=ppt/slides/slide14.xml><?xml version="1.0" encoding="utf-8"?>
 <p:sld xmlns:a="http://schemas.openxmlformats.org/drawingml/2006/main" xmlns:r="http://schemas.openxmlformats.org/officeDocument/2006/relationships" xmlns:p="http://schemas.openxmlformats.org/presentationml/2006/main">
   <p:cSld>
     <p:spTree>
@@ -3804,19 +3888,27 @@
           </a:bodyPr>
           <a:lstStyle/>
           <a:p>
-            <a:r>
-              <a:rPr lang="en-US" dirty="0" smtClean="0"/>
-              <a:t>-    Six sheets of ¾” thick Poly-Carbonate</a:t>
-            </a:r>
-          </a:p>
-          <a:p>
             <a:pPr marL="285750" indent="-285750">
               <a:buFontTx/>
               <a:buChar char="-"/>
             </a:pPr>
             <a:r>
               <a:rPr lang="en-US" dirty="0" smtClean="0"/>
-              <a:t>Milled in BU Machine Shop</a:t>
+              <a:t>Six sheets of ¼” thick Polycarbonate</a:t>
+            </a:r>
+          </a:p>
+          <a:p>
+            <a:pPr marL="285750" indent="-285750">
+              <a:buFontTx/>
+              <a:buChar char="-"/>
+            </a:pPr>
+            <a:r>
+              <a:rPr lang="en-US" smtClean="0"/>
+              <a:t>Machined in BU </a:t>
+            </a:r>
+            <a:r>
+              <a:rPr lang="en-US" dirty="0" smtClean="0"/>
+              <a:t>Machine Shop</a:t>
             </a:r>
           </a:p>
           <a:p>
@@ -3865,10 +3957,17 @@
   <p:clrMapOvr>
     <a:masterClrMapping/>
   </p:clrMapOvr>
+  <p:timing>
+    <p:tnLst>
+      <p:par>
+        <p:cTn id="1" dur="indefinite" restart="never" nodeType="tmRoot"/>
+      </p:par>
+    </p:tnLst>
+  </p:timing>
 </p:sld>
 </file>
 
-<file path=ppt/slides/slide14.xml><?xml version="1.0" encoding="utf-8"?>
+<file path=ppt/slides/slide15.xml><?xml version="1.0" encoding="utf-8"?>
 <p:sld xmlns:a="http://schemas.openxmlformats.org/drawingml/2006/main" xmlns:r="http://schemas.openxmlformats.org/officeDocument/2006/relationships" xmlns:p="http://schemas.openxmlformats.org/presentationml/2006/main">
   <p:cSld>
     <p:spTree>
@@ -3950,10 +4049,114 @@
   <p:clrMapOvr>
     <a:masterClrMapping/>
   </p:clrMapOvr>
+  <p:timing>
+    <p:tnLst>
+      <p:par>
+        <p:cTn id="1" dur="indefinite" restart="never" nodeType="tmRoot"/>
+      </p:par>
+    </p:tnLst>
+  </p:timing>
 </p:sld>
 </file>
 
 <file path=ppt/slides/slide2.xml><?xml version="1.0" encoding="utf-8"?>
+<p:sld xmlns:a="http://schemas.openxmlformats.org/drawingml/2006/main" xmlns:r="http://schemas.openxmlformats.org/officeDocument/2006/relationships" xmlns:p="http://schemas.openxmlformats.org/presentationml/2006/main">
+  <p:cSld>
+    <p:spTree>
+      <p:nvGrpSpPr>
+        <p:cNvPr id="1" name=""/>
+        <p:cNvGrpSpPr/>
+        <p:nvPr/>
+      </p:nvGrpSpPr>
+      <p:grpSpPr>
+        <a:xfrm>
+          <a:off x="0" y="0"/>
+          <a:ext cx="0" cy="0"/>
+          <a:chOff x="0" y="0"/>
+          <a:chExt cx="0" cy="0"/>
+        </a:xfrm>
+      </p:grpSpPr>
+      <p:sp>
+        <p:nvSpPr>
+          <p:cNvPr id="2" name="Title 1"/>
+          <p:cNvSpPr>
+            <a:spLocks noGrp="1"/>
+          </p:cNvSpPr>
+          <p:nvPr>
+            <p:ph type="title"/>
+          </p:nvPr>
+        </p:nvSpPr>
+        <p:spPr>
+          <a:xfrm>
+            <a:off x="457200" y="13855"/>
+            <a:ext cx="8229600" cy="1143000"/>
+          </a:xfrm>
+        </p:spPr>
+        <p:txBody>
+          <a:bodyPr>
+            <a:normAutofit/>
+          </a:bodyPr>
+          <a:lstStyle/>
+          <a:p>
+            <a:r>
+              <a:rPr lang="en-US" sz="3600" dirty="0" smtClean="0"/>
+              <a:t>Real Time Clock UML</a:t>
+            </a:r>
+            <a:endParaRPr lang="en-US" sz="3600" dirty="0"/>
+          </a:p>
+        </p:txBody>
+      </p:sp>
+      <p:pic>
+        <p:nvPicPr>
+          <p:cNvPr id="4" name="Picture 3"/>
+          <p:cNvPicPr>
+            <a:picLocks noChangeAspect="1"/>
+          </p:cNvPicPr>
+          <p:nvPr/>
+        </p:nvPicPr>
+        <p:blipFill>
+          <a:blip r:embed="rId2">
+            <a:extLst>
+              <a:ext uri="{28A0092B-C50C-407E-A947-70E740481C1C}">
+                <a14:useLocalDpi xmlns:a14="http://schemas.microsoft.com/office/drawing/2010/main" val="0"/>
+              </a:ext>
+            </a:extLst>
+          </a:blip>
+          <a:stretch>
+            <a:fillRect/>
+          </a:stretch>
+        </p:blipFill>
+        <p:spPr>
+          <a:xfrm>
+            <a:off x="700571" y="1252809"/>
+            <a:ext cx="7742858" cy="4352381"/>
+          </a:xfrm>
+          <a:prstGeom prst="rect">
+            <a:avLst/>
+          </a:prstGeom>
+        </p:spPr>
+      </p:pic>
+    </p:spTree>
+    <p:extLst>
+      <p:ext uri="{BB962C8B-B14F-4D97-AF65-F5344CB8AC3E}">
+        <p14:creationId xmlns:p14="http://schemas.microsoft.com/office/powerpoint/2010/main" val="1156237837"/>
+      </p:ext>
+    </p:extLst>
+  </p:cSld>
+  <p:clrMapOvr>
+    <a:masterClrMapping/>
+  </p:clrMapOvr>
+  <p:timing>
+    <p:tnLst>
+      <p:par>
+        <p:cTn id="1" dur="indefinite" restart="never" nodeType="tmRoot"/>
+      </p:par>
+    </p:tnLst>
+  </p:timing>
+</p:sld>
+</file>
+
+<file path=ppt/slides/slide3.xml><?xml version="1.0" encoding="utf-8"?>
 <p:sld xmlns:a="http://schemas.openxmlformats.org/drawingml/2006/main" xmlns:r="http://schemas.openxmlformats.org/officeDocument/2006/relationships" xmlns:p="http://schemas.openxmlformats.org/presentationml/2006/main">
   <p:cSld>
     <p:spTree>
@@ -4040,10 +4243,17 @@
   <p:clrMapOvr>
     <a:masterClrMapping/>
   </p:clrMapOvr>
+  <p:timing>
+    <p:tnLst>
+      <p:par>
+        <p:cTn id="1" dur="indefinite" restart="never" nodeType="tmRoot"/>
+      </p:par>
+    </p:tnLst>
+  </p:timing>
 </p:sld>
 </file>
 
-<file path=ppt/slides/slide3.xml><?xml version="1.0" encoding="utf-8"?>
+<file path=ppt/slides/slide4.xml><?xml version="1.0" encoding="utf-8"?>
 <p:sld xmlns:a="http://schemas.openxmlformats.org/drawingml/2006/main" xmlns:r="http://schemas.openxmlformats.org/officeDocument/2006/relationships" xmlns:p="http://schemas.openxmlformats.org/presentationml/2006/main">
   <p:cSld>
     <p:spTree>
@@ -4130,10 +4340,17 @@
   <p:clrMapOvr>
     <a:masterClrMapping/>
   </p:clrMapOvr>
+  <p:timing>
+    <p:tnLst>
+      <p:par>
+        <p:cTn id="1" dur="indefinite" restart="never" nodeType="tmRoot"/>
+      </p:par>
+    </p:tnLst>
+  </p:timing>
 </p:sld>
 </file>
 
-<file path=ppt/slides/slide4.xml><?xml version="1.0" encoding="utf-8"?>
+<file path=ppt/slides/slide5.xml><?xml version="1.0" encoding="utf-8"?>
 <p:sld xmlns:a="http://schemas.openxmlformats.org/drawingml/2006/main" xmlns:r="http://schemas.openxmlformats.org/officeDocument/2006/relationships" xmlns:p="http://schemas.openxmlformats.org/presentationml/2006/main">
   <p:cSld>
     <p:spTree>
@@ -4220,10 +4437,17 @@
   <p:clrMapOvr>
     <a:masterClrMapping/>
   </p:clrMapOvr>
+  <p:timing>
+    <p:tnLst>
+      <p:par>
+        <p:cTn id="1" dur="indefinite" restart="never" nodeType="tmRoot"/>
+      </p:par>
+    </p:tnLst>
+  </p:timing>
 </p:sld>
 </file>
 
-<file path=ppt/slides/slide5.xml><?xml version="1.0" encoding="utf-8"?>
+<file path=ppt/slides/slide6.xml><?xml version="1.0" encoding="utf-8"?>
 <p:sld xmlns:a="http://schemas.openxmlformats.org/drawingml/2006/main" xmlns:r="http://schemas.openxmlformats.org/officeDocument/2006/relationships" xmlns:p="http://schemas.openxmlformats.org/presentationml/2006/main">
   <p:cSld>
     <p:spTree>
@@ -4252,7 +4476,7 @@
         </p:nvSpPr>
         <p:spPr>
           <a:xfrm>
-            <a:off x="457200" y="13855"/>
+            <a:off x="457200" y="0"/>
             <a:ext cx="8229600" cy="1143000"/>
           </a:xfrm>
         </p:spPr>
@@ -4264,7 +4488,7 @@
           <a:p>
             <a:r>
               <a:rPr lang="en-US" sz="3600" dirty="0" smtClean="0"/>
-              <a:t>Real Time Clock UML</a:t>
+              <a:t>Trip Flow and Data Structure</a:t>
             </a:r>
             <a:endParaRPr lang="en-US" sz="3600" dirty="0"/>
           </a:p>
@@ -4272,7 +4496,7 @@
       </p:sp>
       <p:pic>
         <p:nvPicPr>
-          <p:cNvPr id="4" name="Picture 3"/>
+          <p:cNvPr id="6" name="Picture 5"/>
           <p:cNvPicPr>
             <a:picLocks noChangeAspect="1"/>
           </p:cNvPicPr>
@@ -4292,28 +4516,125 @@
         </p:blipFill>
         <p:spPr>
           <a:xfrm>
-            <a:off x="700571" y="1252809"/>
-            <a:ext cx="7742858" cy="4352381"/>
+            <a:off x="13855" y="762000"/>
+            <a:ext cx="9144000" cy="3997132"/>
           </a:xfrm>
           <a:prstGeom prst="rect">
             <a:avLst/>
           </a:prstGeom>
         </p:spPr>
       </p:pic>
+      <p:pic>
+        <p:nvPicPr>
+          <p:cNvPr id="5" name="Picture 4"/>
+          <p:cNvPicPr>
+            <a:picLocks noChangeAspect="1"/>
+          </p:cNvPicPr>
+          <p:nvPr/>
+        </p:nvPicPr>
+        <p:blipFill>
+          <a:blip r:embed="rId3" cstate="print">
+            <a:extLst>
+              <a:ext uri="{28A0092B-C50C-407E-A947-70E740481C1C}">
+                <a14:useLocalDpi xmlns:a14="http://schemas.microsoft.com/office/drawing/2010/main" val="0"/>
+              </a:ext>
+            </a:extLst>
+          </a:blip>
+          <a:stretch>
+            <a:fillRect/>
+          </a:stretch>
+        </p:blipFill>
+        <p:spPr>
+          <a:xfrm>
+            <a:off x="609600" y="3657600"/>
+            <a:ext cx="3639862" cy="3179618"/>
+          </a:xfrm>
+          <a:prstGeom prst="rect">
+            <a:avLst/>
+          </a:prstGeom>
+        </p:spPr>
+      </p:pic>
+      <p:cxnSp>
+        <p:nvCxnSpPr>
+          <p:cNvPr id="8" name="Straight Connector 7"/>
+          <p:cNvCxnSpPr/>
+          <p:nvPr/>
+        </p:nvCxnSpPr>
+        <p:spPr>
+          <a:xfrm flipH="1">
+            <a:off x="2971800" y="4031673"/>
+            <a:ext cx="1277662" cy="0"/>
+          </a:xfrm>
+          <a:prstGeom prst="line">
+            <a:avLst/>
+          </a:prstGeom>
+        </p:spPr>
+        <p:style>
+          <a:lnRef idx="1">
+            <a:schemeClr val="accent1"/>
+          </a:lnRef>
+          <a:fillRef idx="0">
+            <a:schemeClr val="accent1"/>
+          </a:fillRef>
+          <a:effectRef idx="0">
+            <a:schemeClr val="accent1"/>
+          </a:effectRef>
+          <a:fontRef idx="minor">
+            <a:schemeClr val="tx1"/>
+          </a:fontRef>
+        </p:style>
+      </p:cxnSp>
+      <p:cxnSp>
+        <p:nvCxnSpPr>
+          <p:cNvPr id="11" name="Straight Connector 10"/>
+          <p:cNvCxnSpPr/>
+          <p:nvPr/>
+        </p:nvCxnSpPr>
+        <p:spPr>
+          <a:xfrm>
+            <a:off x="2971800" y="3657600"/>
+            <a:ext cx="0" cy="374073"/>
+          </a:xfrm>
+          <a:prstGeom prst="line">
+            <a:avLst/>
+          </a:prstGeom>
+        </p:spPr>
+        <p:style>
+          <a:lnRef idx="1">
+            <a:schemeClr val="accent1"/>
+          </a:lnRef>
+          <a:fillRef idx="0">
+            <a:schemeClr val="accent1"/>
+          </a:fillRef>
+          <a:effectRef idx="0">
+            <a:schemeClr val="accent1"/>
+          </a:effectRef>
+          <a:fontRef idx="minor">
+            <a:schemeClr val="tx1"/>
+          </a:fontRef>
+        </p:style>
+      </p:cxnSp>
     </p:spTree>
     <p:extLst>
       <p:ext uri="{BB962C8B-B14F-4D97-AF65-F5344CB8AC3E}">
-        <p14:creationId xmlns:p14="http://schemas.microsoft.com/office/powerpoint/2010/main" val="1156237837"/>
+        <p14:creationId xmlns:p14="http://schemas.microsoft.com/office/powerpoint/2010/main" val="2325485950"/>
       </p:ext>
     </p:extLst>
   </p:cSld>
   <p:clrMapOvr>
     <a:masterClrMapping/>
   </p:clrMapOvr>
+  <p:timing>
+    <p:tnLst>
+      <p:par>
+        <p:cTn id="1" dur="indefinite" restart="never" nodeType="tmRoot"/>
+      </p:par>
+    </p:tnLst>
+  </p:timing>
 </p:sld>
 </file>
 
-<file path=ppt/slides/slide6.xml><?xml version="1.0" encoding="utf-8"?>
+<file path=ppt/slides/slide7.xml><?xml version="1.0" encoding="utf-8"?>
 <p:sld xmlns:a="http://schemas.openxmlformats.org/drawingml/2006/main" xmlns:r="http://schemas.openxmlformats.org/officeDocument/2006/relationships" xmlns:p="http://schemas.openxmlformats.org/presentationml/2006/main">
   <p:cSld>
     <p:spTree>
@@ -4370,10 +4691,17 @@
   <p:clrMapOvr>
     <a:masterClrMapping/>
   </p:clrMapOvr>
+  <p:timing>
+    <p:tnLst>
+      <p:par>
+        <p:cTn id="1" dur="indefinite" restart="never" nodeType="tmRoot"/>
+      </p:par>
+    </p:tnLst>
+  </p:timing>
 </p:sld>
 </file>
 
-<file path=ppt/slides/slide7.xml><?xml version="1.0" encoding="utf-8"?>
+<file path=ppt/slides/slide8.xml><?xml version="1.0" encoding="utf-8"?>
 <p:sld xmlns:a="http://schemas.openxmlformats.org/drawingml/2006/main" xmlns:r="http://schemas.openxmlformats.org/officeDocument/2006/relationships" xmlns:p="http://schemas.openxmlformats.org/presentationml/2006/main">
   <p:cSld>
     <p:spTree>
@@ -4433,7 +4761,7 @@
 </p:sld>
 </file>
 
-<file path=ppt/slides/slide8.xml><?xml version="1.0" encoding="utf-8"?>
+<file path=ppt/slides/slide9.xml><?xml version="1.0" encoding="utf-8"?>
 <p:sld xmlns:a="http://schemas.openxmlformats.org/drawingml/2006/main" xmlns:r="http://schemas.openxmlformats.org/officeDocument/2006/relationships" xmlns:p="http://schemas.openxmlformats.org/presentationml/2006/main">
   <p:cSld>
     <p:spTree>
@@ -4484,66 +4812,6 @@
     <p:extLst>
       <p:ext uri="{BB962C8B-B14F-4D97-AF65-F5344CB8AC3E}">
         <p14:creationId xmlns:p14="http://schemas.microsoft.com/office/powerpoint/2010/main" val="331763544"/>
-      </p:ext>
-    </p:extLst>
-  </p:cSld>
-  <p:clrMapOvr>
-    <a:masterClrMapping/>
-  </p:clrMapOvr>
-</p:sld>
-</file>
-
-<file path=ppt/slides/slide9.xml><?xml version="1.0" encoding="utf-8"?>
-<p:sld xmlns:a="http://schemas.openxmlformats.org/drawingml/2006/main" xmlns:r="http://schemas.openxmlformats.org/officeDocument/2006/relationships" xmlns:p="http://schemas.openxmlformats.org/presentationml/2006/main">
-  <p:cSld>
-    <p:spTree>
-      <p:nvGrpSpPr>
-        <p:cNvPr id="1" name=""/>
-        <p:cNvGrpSpPr/>
-        <p:nvPr/>
-      </p:nvGrpSpPr>
-      <p:grpSpPr>
-        <a:xfrm>
-          <a:off x="0" y="0"/>
-          <a:ext cx="0" cy="0"/>
-          <a:chOff x="0" y="0"/>
-          <a:chExt cx="0" cy="0"/>
-        </a:xfrm>
-      </p:grpSpPr>
-      <p:pic>
-        <p:nvPicPr>
-          <p:cNvPr id="2" name="Picture 1"/>
-          <p:cNvPicPr>
-            <a:picLocks noChangeAspect="1"/>
-          </p:cNvPicPr>
-          <p:nvPr/>
-        </p:nvPicPr>
-        <p:blipFill>
-          <a:blip r:embed="rId2" cstate="print">
-            <a:extLst>
-              <a:ext uri="{28A0092B-C50C-407E-A947-70E740481C1C}">
-                <a14:useLocalDpi xmlns:a14="http://schemas.microsoft.com/office/drawing/2010/main" val="0"/>
-              </a:ext>
-            </a:extLst>
-          </a:blip>
-          <a:stretch>
-            <a:fillRect/>
-          </a:stretch>
-        </p:blipFill>
-        <p:spPr>
-          <a:xfrm>
-            <a:off x="134470" y="0"/>
-            <a:ext cx="8875059" cy="6858000"/>
-          </a:xfrm>
-          <a:prstGeom prst="rect">
-            <a:avLst/>
-          </a:prstGeom>
-        </p:spPr>
-      </p:pic>
-    </p:spTree>
-    <p:extLst>
-      <p:ext uri="{BB962C8B-B14F-4D97-AF65-F5344CB8AC3E}">
-        <p14:creationId xmlns:p14="http://schemas.microsoft.com/office/powerpoint/2010/main" val="3633874506"/>
       </p:ext>
     </p:extLst>
   </p:cSld>

</xml_diff>